<commit_message>
feito em casa 02/01
</commit_message>
<xml_diff>
--- a/entities.pptx
+++ b/entities.pptx
@@ -6,6 +6,7 @@
   </p:sldMasterIdLst>
   <p:sldIdLst>
     <p:sldId id="256" r:id="rId2"/>
+    <p:sldId id="257" r:id="rId3"/>
   </p:sldIdLst>
   <p:sldSz cx="12192000" cy="6858000"/>
   <p:notesSz cx="6858000" cy="9144000"/>
@@ -259,7 +260,7 @@
           <a:p>
             <a:fld id="{2E52B963-82F4-47E8-ACA6-642607281677}" type="datetimeFigureOut">
               <a:rPr lang="pt-BR" smtClean="0"/>
-              <a:t>21/12/2023</a:t>
+              <a:t>02/01/2024</a:t>
             </a:fld>
             <a:endParaRPr lang="pt-BR"/>
           </a:p>
@@ -457,7 +458,7 @@
           <a:p>
             <a:fld id="{2E52B963-82F4-47E8-ACA6-642607281677}" type="datetimeFigureOut">
               <a:rPr lang="pt-BR" smtClean="0"/>
-              <a:t>21/12/2023</a:t>
+              <a:t>02/01/2024</a:t>
             </a:fld>
             <a:endParaRPr lang="pt-BR"/>
           </a:p>
@@ -665,7 +666,7 @@
           <a:p>
             <a:fld id="{2E52B963-82F4-47E8-ACA6-642607281677}" type="datetimeFigureOut">
               <a:rPr lang="pt-BR" smtClean="0"/>
-              <a:t>21/12/2023</a:t>
+              <a:t>02/01/2024</a:t>
             </a:fld>
             <a:endParaRPr lang="pt-BR"/>
           </a:p>
@@ -863,7 +864,7 @@
           <a:p>
             <a:fld id="{2E52B963-82F4-47E8-ACA6-642607281677}" type="datetimeFigureOut">
               <a:rPr lang="pt-BR" smtClean="0"/>
-              <a:t>21/12/2023</a:t>
+              <a:t>02/01/2024</a:t>
             </a:fld>
             <a:endParaRPr lang="pt-BR"/>
           </a:p>
@@ -1138,7 +1139,7 @@
           <a:p>
             <a:fld id="{2E52B963-82F4-47E8-ACA6-642607281677}" type="datetimeFigureOut">
               <a:rPr lang="pt-BR" smtClean="0"/>
-              <a:t>21/12/2023</a:t>
+              <a:t>02/01/2024</a:t>
             </a:fld>
             <a:endParaRPr lang="pt-BR"/>
           </a:p>
@@ -1403,7 +1404,7 @@
           <a:p>
             <a:fld id="{2E52B963-82F4-47E8-ACA6-642607281677}" type="datetimeFigureOut">
               <a:rPr lang="pt-BR" smtClean="0"/>
-              <a:t>21/12/2023</a:t>
+              <a:t>02/01/2024</a:t>
             </a:fld>
             <a:endParaRPr lang="pt-BR"/>
           </a:p>
@@ -1815,7 +1816,7 @@
           <a:p>
             <a:fld id="{2E52B963-82F4-47E8-ACA6-642607281677}" type="datetimeFigureOut">
               <a:rPr lang="pt-BR" smtClean="0"/>
-              <a:t>21/12/2023</a:t>
+              <a:t>02/01/2024</a:t>
             </a:fld>
             <a:endParaRPr lang="pt-BR"/>
           </a:p>
@@ -1956,7 +1957,7 @@
           <a:p>
             <a:fld id="{2E52B963-82F4-47E8-ACA6-642607281677}" type="datetimeFigureOut">
               <a:rPr lang="pt-BR" smtClean="0"/>
-              <a:t>21/12/2023</a:t>
+              <a:t>02/01/2024</a:t>
             </a:fld>
             <a:endParaRPr lang="pt-BR"/>
           </a:p>
@@ -2069,7 +2070,7 @@
           <a:p>
             <a:fld id="{2E52B963-82F4-47E8-ACA6-642607281677}" type="datetimeFigureOut">
               <a:rPr lang="pt-BR" smtClean="0"/>
-              <a:t>21/12/2023</a:t>
+              <a:t>02/01/2024</a:t>
             </a:fld>
             <a:endParaRPr lang="pt-BR"/>
           </a:p>
@@ -2380,7 +2381,7 @@
           <a:p>
             <a:fld id="{2E52B963-82F4-47E8-ACA6-642607281677}" type="datetimeFigureOut">
               <a:rPr lang="pt-BR" smtClean="0"/>
-              <a:t>21/12/2023</a:t>
+              <a:t>02/01/2024</a:t>
             </a:fld>
             <a:endParaRPr lang="pt-BR"/>
           </a:p>
@@ -2668,7 +2669,7 @@
           <a:p>
             <a:fld id="{2E52B963-82F4-47E8-ACA6-642607281677}" type="datetimeFigureOut">
               <a:rPr lang="pt-BR" smtClean="0"/>
-              <a:t>21/12/2023</a:t>
+              <a:t>02/01/2024</a:t>
             </a:fld>
             <a:endParaRPr lang="pt-BR"/>
           </a:p>
@@ -2909,7 +2910,7 @@
           <a:p>
             <a:fld id="{2E52B963-82F4-47E8-ACA6-642607281677}" type="datetimeFigureOut">
               <a:rPr lang="pt-BR" smtClean="0"/>
-              <a:t>21/12/2023</a:t>
+              <a:t>02/01/2024</a:t>
             </a:fld>
             <a:endParaRPr lang="pt-BR"/>
           </a:p>
@@ -4082,6 +4083,66 @@
 </p:sld>
 </file>
 
+<file path=ppt/slides/slide2.xml><?xml version="1.0" encoding="utf-8"?>
+<p:sld xmlns:a="http://schemas.openxmlformats.org/drawingml/2006/main" xmlns:r="http://schemas.openxmlformats.org/officeDocument/2006/relationships" xmlns:p="http://schemas.openxmlformats.org/presentationml/2006/main">
+  <p:cSld>
+    <p:spTree>
+      <p:nvGrpSpPr>
+        <p:cNvPr id="1" name=""/>
+        <p:cNvGrpSpPr/>
+        <p:nvPr/>
+      </p:nvGrpSpPr>
+      <p:grpSpPr>
+        <a:xfrm>
+          <a:off x="0" y="0"/>
+          <a:ext cx="0" cy="0"/>
+          <a:chOff x="0" y="0"/>
+          <a:chExt cx="0" cy="0"/>
+        </a:xfrm>
+      </p:grpSpPr>
+      <p:pic>
+        <p:nvPicPr>
+          <p:cNvPr id="3" name="Imagem 2">
+            <a:extLst>
+              <a:ext uri="{FF2B5EF4-FFF2-40B4-BE49-F238E27FC236}">
+                <a16:creationId xmlns:a16="http://schemas.microsoft.com/office/drawing/2014/main" id="{3E9AE1AD-9151-E379-4A6F-90AFA8B2B73F}"/>
+              </a:ext>
+            </a:extLst>
+          </p:cNvPr>
+          <p:cNvPicPr>
+            <a:picLocks noChangeAspect="1"/>
+          </p:cNvPicPr>
+          <p:nvPr/>
+        </p:nvPicPr>
+        <p:blipFill>
+          <a:blip r:embed="rId2"/>
+          <a:stretch>
+            <a:fillRect/>
+          </a:stretch>
+        </p:blipFill>
+        <p:spPr>
+          <a:xfrm>
+            <a:off x="2285107" y="0"/>
+            <a:ext cx="7621786" cy="6858000"/>
+          </a:xfrm>
+          <a:prstGeom prst="rect">
+            <a:avLst/>
+          </a:prstGeom>
+        </p:spPr>
+      </p:pic>
+    </p:spTree>
+    <p:extLst>
+      <p:ext uri="{BB962C8B-B14F-4D97-AF65-F5344CB8AC3E}">
+        <p14:creationId xmlns:p14="http://schemas.microsoft.com/office/powerpoint/2010/main" val="2873203249"/>
+      </p:ext>
+    </p:extLst>
+  </p:cSld>
+  <p:clrMapOvr>
+    <a:masterClrMapping/>
+  </p:clrMapOvr>
+</p:sld>
+</file>
+
 <file path=ppt/theme/theme1.xml><?xml version="1.0" encoding="utf-8"?>
 <a:theme xmlns:a="http://schemas.openxmlformats.org/drawingml/2006/main" name="Tema do Office">
   <a:themeElements>

</xml_diff>

<commit_message>
implementacao incompleta de localizacao
</commit_message>
<xml_diff>
--- a/entities.pptx
+++ b/entities.pptx
@@ -260,7 +260,7 @@
           <a:p>
             <a:fld id="{2E52B963-82F4-47E8-ACA6-642607281677}" type="datetimeFigureOut">
               <a:rPr lang="pt-BR" smtClean="0"/>
-              <a:t>02/01/2024</a:t>
+              <a:t>01/04/2024</a:t>
             </a:fld>
             <a:endParaRPr lang="pt-BR"/>
           </a:p>
@@ -458,7 +458,7 @@
           <a:p>
             <a:fld id="{2E52B963-82F4-47E8-ACA6-642607281677}" type="datetimeFigureOut">
               <a:rPr lang="pt-BR" smtClean="0"/>
-              <a:t>02/01/2024</a:t>
+              <a:t>01/04/2024</a:t>
             </a:fld>
             <a:endParaRPr lang="pt-BR"/>
           </a:p>
@@ -666,7 +666,7 @@
           <a:p>
             <a:fld id="{2E52B963-82F4-47E8-ACA6-642607281677}" type="datetimeFigureOut">
               <a:rPr lang="pt-BR" smtClean="0"/>
-              <a:t>02/01/2024</a:t>
+              <a:t>01/04/2024</a:t>
             </a:fld>
             <a:endParaRPr lang="pt-BR"/>
           </a:p>
@@ -864,7 +864,7 @@
           <a:p>
             <a:fld id="{2E52B963-82F4-47E8-ACA6-642607281677}" type="datetimeFigureOut">
               <a:rPr lang="pt-BR" smtClean="0"/>
-              <a:t>02/01/2024</a:t>
+              <a:t>01/04/2024</a:t>
             </a:fld>
             <a:endParaRPr lang="pt-BR"/>
           </a:p>
@@ -1139,7 +1139,7 @@
           <a:p>
             <a:fld id="{2E52B963-82F4-47E8-ACA6-642607281677}" type="datetimeFigureOut">
               <a:rPr lang="pt-BR" smtClean="0"/>
-              <a:t>02/01/2024</a:t>
+              <a:t>01/04/2024</a:t>
             </a:fld>
             <a:endParaRPr lang="pt-BR"/>
           </a:p>
@@ -1404,7 +1404,7 @@
           <a:p>
             <a:fld id="{2E52B963-82F4-47E8-ACA6-642607281677}" type="datetimeFigureOut">
               <a:rPr lang="pt-BR" smtClean="0"/>
-              <a:t>02/01/2024</a:t>
+              <a:t>01/04/2024</a:t>
             </a:fld>
             <a:endParaRPr lang="pt-BR"/>
           </a:p>
@@ -1816,7 +1816,7 @@
           <a:p>
             <a:fld id="{2E52B963-82F4-47E8-ACA6-642607281677}" type="datetimeFigureOut">
               <a:rPr lang="pt-BR" smtClean="0"/>
-              <a:t>02/01/2024</a:t>
+              <a:t>01/04/2024</a:t>
             </a:fld>
             <a:endParaRPr lang="pt-BR"/>
           </a:p>
@@ -1957,7 +1957,7 @@
           <a:p>
             <a:fld id="{2E52B963-82F4-47E8-ACA6-642607281677}" type="datetimeFigureOut">
               <a:rPr lang="pt-BR" smtClean="0"/>
-              <a:t>02/01/2024</a:t>
+              <a:t>01/04/2024</a:t>
             </a:fld>
             <a:endParaRPr lang="pt-BR"/>
           </a:p>
@@ -2070,7 +2070,7 @@
           <a:p>
             <a:fld id="{2E52B963-82F4-47E8-ACA6-642607281677}" type="datetimeFigureOut">
               <a:rPr lang="pt-BR" smtClean="0"/>
-              <a:t>02/01/2024</a:t>
+              <a:t>01/04/2024</a:t>
             </a:fld>
             <a:endParaRPr lang="pt-BR"/>
           </a:p>
@@ -2381,7 +2381,7 @@
           <a:p>
             <a:fld id="{2E52B963-82F4-47E8-ACA6-642607281677}" type="datetimeFigureOut">
               <a:rPr lang="pt-BR" smtClean="0"/>
-              <a:t>02/01/2024</a:t>
+              <a:t>01/04/2024</a:t>
             </a:fld>
             <a:endParaRPr lang="pt-BR"/>
           </a:p>
@@ -2669,7 +2669,7 @@
           <a:p>
             <a:fld id="{2E52B963-82F4-47E8-ACA6-642607281677}" type="datetimeFigureOut">
               <a:rPr lang="pt-BR" smtClean="0"/>
-              <a:t>02/01/2024</a:t>
+              <a:t>01/04/2024</a:t>
             </a:fld>
             <a:endParaRPr lang="pt-BR"/>
           </a:p>
@@ -2910,7 +2910,7 @@
           <a:p>
             <a:fld id="{2E52B963-82F4-47E8-ACA6-642607281677}" type="datetimeFigureOut">
               <a:rPr lang="pt-BR" smtClean="0"/>
-              <a:t>02/01/2024</a:t>
+              <a:t>01/04/2024</a:t>
             </a:fld>
             <a:endParaRPr lang="pt-BR"/>
           </a:p>
@@ -4047,6 +4047,108 @@
           <a:xfrm flipV="1">
             <a:off x="3225360" y="2477406"/>
             <a:ext cx="0" cy="1860419"/>
+          </a:xfrm>
+          <a:prstGeom prst="line">
+            <a:avLst/>
+          </a:prstGeom>
+          <a:ln>
+            <a:headEnd type="oval"/>
+          </a:ln>
+        </p:spPr>
+        <p:style>
+          <a:lnRef idx="1">
+            <a:schemeClr val="accent1"/>
+          </a:lnRef>
+          <a:fillRef idx="0">
+            <a:schemeClr val="accent1"/>
+          </a:fillRef>
+          <a:effectRef idx="0">
+            <a:schemeClr val="accent1"/>
+          </a:effectRef>
+          <a:fontRef idx="minor">
+            <a:schemeClr val="tx1"/>
+          </a:fontRef>
+        </p:style>
+      </p:cxnSp>
+      <p:sp>
+        <p:nvSpPr>
+          <p:cNvPr id="3" name="Retângulo 2">
+            <a:extLst>
+              <a:ext uri="{FF2B5EF4-FFF2-40B4-BE49-F238E27FC236}">
+                <a16:creationId xmlns:a16="http://schemas.microsoft.com/office/drawing/2014/main" id="{95D9357A-79B3-E840-D311-B5F584428F6E}"/>
+              </a:ext>
+            </a:extLst>
+          </p:cNvPr>
+          <p:cNvSpPr/>
+          <p:nvPr/>
+        </p:nvSpPr>
+        <p:spPr>
+          <a:xfrm>
+            <a:off x="9899227" y="1784468"/>
+            <a:ext cx="1545345" cy="692938"/>
+          </a:xfrm>
+          <a:prstGeom prst="rect">
+            <a:avLst/>
+          </a:prstGeom>
+          <a:noFill/>
+        </p:spPr>
+        <p:style>
+          <a:lnRef idx="2">
+            <a:schemeClr val="accent1">
+              <a:shade val="50000"/>
+            </a:schemeClr>
+          </a:lnRef>
+          <a:fillRef idx="1">
+            <a:schemeClr val="accent1"/>
+          </a:fillRef>
+          <a:effectRef idx="0">
+            <a:schemeClr val="accent1"/>
+          </a:effectRef>
+          <a:fontRef idx="minor">
+            <a:schemeClr val="lt1"/>
+          </a:fontRef>
+        </p:style>
+        <p:txBody>
+          <a:bodyPr rtlCol="0" anchor="ctr"/>
+          <a:lstStyle/>
+          <a:p>
+            <a:pPr algn="ctr"/>
+            <a:r>
+              <a:rPr lang="pt-BR" dirty="0" err="1">
+                <a:solidFill>
+                  <a:schemeClr val="tx1"/>
+                </a:solidFill>
+              </a:rPr>
+              <a:t>emprestimos</a:t>
+            </a:r>
+            <a:endParaRPr lang="pt-BR" dirty="0">
+              <a:solidFill>
+                <a:schemeClr val="tx1"/>
+              </a:solidFill>
+            </a:endParaRPr>
+          </a:p>
+        </p:txBody>
+      </p:sp>
+      <p:cxnSp>
+        <p:nvCxnSpPr>
+          <p:cNvPr id="4" name="Conector reto 3">
+            <a:extLst>
+              <a:ext uri="{FF2B5EF4-FFF2-40B4-BE49-F238E27FC236}">
+                <a16:creationId xmlns:a16="http://schemas.microsoft.com/office/drawing/2014/main" id="{CBEF3789-8ABD-89D6-8B97-44380A679221}"/>
+              </a:ext>
+            </a:extLst>
+          </p:cNvPr>
+          <p:cNvCxnSpPr>
+            <a:cxnSpLocks/>
+            <a:stCxn id="3" idx="1"/>
+            <a:endCxn id="7" idx="3"/>
+          </p:cNvCxnSpPr>
+          <p:nvPr/>
+        </p:nvCxnSpPr>
+        <p:spPr>
+          <a:xfrm flipH="1">
+            <a:off x="9219507" y="2130937"/>
+            <a:ext cx="679720" cy="0"/>
           </a:xfrm>
           <a:prstGeom prst="line">
             <a:avLst/>

</xml_diff>